<commit_message>
edit slidesS12/inversesmodn.pptx phi.pptx not on purpose
</commit_message>
<xml_diff>
--- a/spring12/slidesS12/inversesmodn.pptx
+++ b/spring12/slidesS12/inversesmodn.pptx
@@ -1941,7 +1941,7 @@
       </p:sp>
       <p:sp>
         <p:nvSpPr>
-          <p:cNvPr id="6" name="Slide Number Placeholder 9"/>
+          <p:cNvPr id="5" name="Slide Number Placeholder 9"/>
           <p:cNvSpPr>
             <a:spLocks noGrp="1"/>
           </p:cNvSpPr>
@@ -1951,8 +1951,8 @@
         </p:nvSpPr>
         <p:spPr>
           <a:xfrm>
-            <a:off x="7924800" y="6553200"/>
-            <a:ext cx="1219200" cy="304801"/>
+            <a:off x="7467600" y="6553200"/>
+            <a:ext cx="1676400" cy="304801"/>
           </a:xfrm>
           <a:prstGeom prst="rect">
             <a:avLst/>
@@ -1972,11 +1972,11 @@
           <a:p>
             <a:r>
               <a:rPr lang="en-US" dirty="0" err="1" smtClean="0"/>
-              <a:t>lec</a:t>
+              <a:t>inversemodn</a:t>
             </a:r>
             <a:r>
               <a:rPr lang="en-US" dirty="0" smtClean="0"/>
-              <a:t> 5W.</a:t>
+              <a:t>.</a:t>
             </a:r>
             <a:fld id="{5653AFC6-B420-2E4E-AAAC-D734658728B4}" type="slidenum">
               <a:rPr lang="en-US" smtClean="0"/>
@@ -2052,7 +2052,7 @@
       </p:sp>
       <p:sp>
         <p:nvSpPr>
-          <p:cNvPr id="5" name="Slide Number Placeholder 9"/>
+          <p:cNvPr id="4" name="Slide Number Placeholder 9"/>
           <p:cNvSpPr>
             <a:spLocks noGrp="1"/>
           </p:cNvSpPr>
@@ -2062,8 +2062,8 @@
         </p:nvSpPr>
         <p:spPr>
           <a:xfrm>
-            <a:off x="7924800" y="6553200"/>
-            <a:ext cx="1219200" cy="304801"/>
+            <a:off x="7467600" y="6553200"/>
+            <a:ext cx="1676400" cy="304801"/>
           </a:xfrm>
           <a:prstGeom prst="rect">
             <a:avLst/>
@@ -2083,11 +2083,11 @@
           <a:p>
             <a:r>
               <a:rPr lang="en-US" dirty="0" err="1" smtClean="0"/>
-              <a:t>lec</a:t>
+              <a:t>inversemodn</a:t>
             </a:r>
             <a:r>
               <a:rPr lang="en-US" dirty="0" smtClean="0"/>
-              <a:t> 5W.</a:t>
+              <a:t>.</a:t>
             </a:r>
             <a:fld id="{5653AFC6-B420-2E4E-AAAC-D734658728B4}" type="slidenum">
               <a:rPr lang="en-US" smtClean="0"/>
@@ -2132,7 +2132,7 @@
       </p:grpSpPr>
       <p:sp>
         <p:nvSpPr>
-          <p:cNvPr id="4" name="Slide Number Placeholder 9"/>
+          <p:cNvPr id="3" name="Slide Number Placeholder 9"/>
           <p:cNvSpPr>
             <a:spLocks noGrp="1"/>
           </p:cNvSpPr>
@@ -2142,8 +2142,8 @@
         </p:nvSpPr>
         <p:spPr>
           <a:xfrm>
-            <a:off x="7924800" y="6553200"/>
-            <a:ext cx="1219200" cy="304801"/>
+            <a:off x="7467600" y="6553199"/>
+            <a:ext cx="1676400" cy="304801"/>
           </a:xfrm>
           <a:prstGeom prst="rect">
             <a:avLst/>
@@ -2163,11 +2163,11 @@
           <a:p>
             <a:r>
               <a:rPr lang="en-US" dirty="0" err="1" smtClean="0"/>
-              <a:t>lec</a:t>
+              <a:t>inversemodn</a:t>
             </a:r>
             <a:r>
               <a:rPr lang="en-US" dirty="0" smtClean="0"/>
-              <a:t> 5W.</a:t>
+              <a:t>.</a:t>
             </a:r>
             <a:fld id="{5653AFC6-B420-2E4E-AAAC-D734658728B4}" type="slidenum">
               <a:rPr lang="en-US" smtClean="0"/>
@@ -2407,7 +2407,22 @@
                 <a:uFillTx/>
                 <a:latin typeface="Comic Sans MS" pitchFamily="66" charset="0"/>
               </a:rPr>
-              <a:t>Albert R Meyer,        March 7, 2012</a:t>
+              <a:t>Albert R Meyer,        March </a:t>
+            </a:r>
+            <a:r>
+              <a:rPr kumimoji="0" lang="en-US" sz="1200" b="0" i="0" u="none" strike="noStrike" kern="1200" cap="none" spc="0" normalizeH="0" baseline="0" noProof="0" dirty="0" smtClean="0">
+                <a:ln>
+                  <a:noFill/>
+                </a:ln>
+                <a:solidFill>
+                  <a:schemeClr val="tx1"/>
+                </a:solidFill>
+                <a:effectLst/>
+                <a:uLnTx/>
+                <a:uFillTx/>
+                <a:latin typeface="Comic Sans MS" pitchFamily="66" charset="0"/>
+              </a:rPr>
+              <a:t>9, 2015</a:t>
             </a:r>
             <a:endParaRPr kumimoji="0" lang="en-US" sz="1200" b="0" i="0" u="none" strike="noStrike" kern="1200" cap="none" spc="0" normalizeH="0" baseline="0" noProof="0" dirty="0">
               <a:ln>
@@ -2424,30 +2439,6 @@
           </a:p>
         </p:txBody>
       </p:sp>
-      <p:pic>
-        <p:nvPicPr>
-          <p:cNvPr id="9" name="Picture 8" descr="license.img"/>
-          <p:cNvPicPr>
-            <a:picLocks/>
-          </p:cNvPicPr>
-          <p:nvPr userDrawn="1"/>
-        </p:nvPicPr>
-        <p:blipFill>
-          <a:blip r:embed="rId6"/>
-          <a:stretch>
-            <a:fillRect/>
-          </a:stretch>
-        </p:blipFill>
-        <p:spPr>
-          <a:xfrm>
-            <a:off x="38415" y="6553200"/>
-            <a:ext cx="875985" cy="290315"/>
-          </a:xfrm>
-          <a:prstGeom prst="rect">
-            <a:avLst/>
-          </a:prstGeom>
-        </p:spPr>
-      </p:pic>
       <p:sp>
         <p:nvSpPr>
           <p:cNvPr id="10" name="Slide Number Placeholder 9"/>
@@ -2460,8 +2451,8 @@
         </p:nvSpPr>
         <p:spPr>
           <a:xfrm>
-            <a:off x="7924800" y="6553200"/>
-            <a:ext cx="1219200" cy="304801"/>
+            <a:off x="7467600" y="6553200"/>
+            <a:ext cx="1676400" cy="304801"/>
           </a:xfrm>
           <a:prstGeom prst="rect">
             <a:avLst/>
@@ -2481,11 +2472,11 @@
           <a:p>
             <a:r>
               <a:rPr lang="en-US" dirty="0" err="1" smtClean="0"/>
-              <a:t>lec</a:t>
+              <a:t>inversemodn</a:t>
             </a:r>
             <a:r>
               <a:rPr lang="en-US" dirty="0" smtClean="0"/>
-              <a:t> 5W.</a:t>
+              <a:t>.</a:t>
             </a:r>
             <a:fld id="{5653AFC6-B420-2E4E-AAAC-D734658728B4}" type="slidenum">
               <a:rPr lang="en-US" smtClean="0"/>
@@ -2496,6 +2487,30 @@
           </a:p>
         </p:txBody>
       </p:sp>
+      <p:pic>
+        <p:nvPicPr>
+          <p:cNvPr id="11" name="Picture 10"/>
+          <p:cNvPicPr>
+            <a:picLocks noChangeAspect="1"/>
+          </p:cNvPicPr>
+          <p:nvPr userDrawn="1"/>
+        </p:nvPicPr>
+        <p:blipFill>
+          <a:blip r:embed="rId6"/>
+          <a:stretch>
+            <a:fillRect/>
+          </a:stretch>
+        </p:blipFill>
+        <p:spPr>
+          <a:xfrm>
+            <a:off x="0" y="6500090"/>
+            <a:ext cx="1016000" cy="357909"/>
+          </a:xfrm>
+          <a:prstGeom prst="rect">
+            <a:avLst/>
+          </a:prstGeom>
+        </p:spPr>
+      </p:pic>
     </p:spTree>
   </p:cSld>
   <p:clrMap bg1="lt1" tx1="dk1" bg2="lt2" tx2="dk2" accent1="accent1" accent2="accent2" accent3="accent3" accent4="accent4" accent5="accent5" accent6="accent6" hlink="hlink" folHlink="folHlink"/>
@@ -3064,11 +3079,11 @@
           <a:p>
             <a:r>
               <a:rPr lang="en-US" dirty="0" err="1" smtClean="0"/>
-              <a:t>lec</a:t>
+              <a:t>inversemodn</a:t>
             </a:r>
             <a:r>
               <a:rPr lang="en-US" dirty="0" smtClean="0"/>
-              <a:t> 5W.</a:t>
+              <a:t>.</a:t>
             </a:r>
             <a:fld id="{5653AFC6-B420-2E4E-AAAC-D734658728B4}" type="slidenum">
               <a:rPr lang="en-US" smtClean="0"/>
@@ -3538,11 +3553,11 @@
           <a:p>
             <a:r>
               <a:rPr lang="en-US" dirty="0" err="1" smtClean="0"/>
-              <a:t>lec</a:t>
+              <a:t>inversemodn</a:t>
             </a:r>
             <a:r>
               <a:rPr lang="en-US" dirty="0" smtClean="0"/>
-              <a:t> 5W.</a:t>
+              <a:t>.</a:t>
             </a:r>
             <a:fld id="{5653AFC6-B420-2E4E-AAAC-D734658728B4}" type="slidenum">
               <a:rPr lang="en-US" smtClean="0"/>
@@ -3932,9 +3947,9 @@
             <a:avLst/>
           </a:prstGeom>
           <a:noFill/>
-          <a:ln w="41275">
+          <a:ln w="50800">
             <a:solidFill>
-              <a:schemeClr val="tx1"/>
+              <a:srgbClr val="FF00FF"/>
             </a:solidFill>
             <a:prstDash val="sysDash"/>
             <a:round/>
@@ -3967,9 +3982,9 @@
             <a:avLst/>
           </a:prstGeom>
           <a:noFill/>
-          <a:ln w="41275">
+          <a:ln w="50800">
             <a:solidFill>
-              <a:schemeClr val="tx1"/>
+              <a:srgbClr val="FF00FF"/>
             </a:solidFill>
             <a:prstDash val="sysDash"/>
             <a:round/>
@@ -4007,11 +4022,11 @@
           <a:p>
             <a:r>
               <a:rPr lang="en-US" dirty="0" err="1" smtClean="0"/>
-              <a:t>lec</a:t>
+              <a:t>inversemodn</a:t>
             </a:r>
             <a:r>
               <a:rPr lang="en-US" dirty="0" smtClean="0"/>
-              <a:t> 5W.</a:t>
+              <a:t>.</a:t>
             </a:r>
             <a:fld id="{5653AFC6-B420-2E4E-AAAC-D734658728B4}" type="slidenum">
               <a:rPr lang="en-US" smtClean="0"/>
@@ -4781,11 +4796,11 @@
           <a:p>
             <a:r>
               <a:rPr lang="en-US" dirty="0" err="1" smtClean="0"/>
-              <a:t>lec</a:t>
+              <a:t>inversemodn</a:t>
             </a:r>
             <a:r>
               <a:rPr lang="en-US" dirty="0" smtClean="0"/>
-              <a:t> 5W.</a:t>
+              <a:t>.</a:t>
             </a:r>
             <a:fld id="{5653AFC6-B420-2E4E-AAAC-D734658728B4}" type="slidenum">
               <a:rPr lang="en-US" smtClean="0"/>
@@ -5248,11 +5263,11 @@
           <a:p>
             <a:r>
               <a:rPr lang="en-US" dirty="0" err="1" smtClean="0"/>
-              <a:t>lec</a:t>
+              <a:t>inversemodn</a:t>
             </a:r>
             <a:r>
               <a:rPr lang="en-US" dirty="0" smtClean="0"/>
-              <a:t> 5W.</a:t>
+              <a:t>.</a:t>
             </a:r>
             <a:fld id="{5653AFC6-B420-2E4E-AAAC-D734658728B4}" type="slidenum">
               <a:rPr lang="en-US" smtClean="0"/>
@@ -5630,7 +5645,7 @@
           <a:graphicData uri="http://schemas.openxmlformats.org/presentationml/2006/ole">
             <mc:AlternateContent xmlns:mc="http://schemas.openxmlformats.org/markup-compatibility/2006">
               <mc:Choice xmlns:v="urn:schemas-microsoft-com:vml" Requires="v">
-                <p:oleObj spid="_x0000_s1058" name="Equation" r:id="rId4" imgW="1498600" imgH="965200" progId="Equation.3">
+                <p:oleObj spid="_x0000_s1061" name="Equation" r:id="rId4" imgW="1498600" imgH="965200" progId="Equation.3">
                   <p:embed/>
                 </p:oleObj>
               </mc:Choice>
@@ -5728,11 +5743,11 @@
           <a:p>
             <a:r>
               <a:rPr lang="en-US" dirty="0" err="1" smtClean="0"/>
-              <a:t>lec</a:t>
+              <a:t>inversemodn</a:t>
             </a:r>
             <a:r>
               <a:rPr lang="en-US" dirty="0" smtClean="0"/>
-              <a:t> 5W.</a:t>
+              <a:t>.</a:t>
             </a:r>
             <a:fld id="{5653AFC6-B420-2E4E-AAAC-D734658728B4}" type="slidenum">
               <a:rPr lang="en-US" smtClean="0"/>
@@ -5810,7 +5825,7 @@
           <a:graphicData uri="http://schemas.openxmlformats.org/presentationml/2006/ole">
             <mc:AlternateContent xmlns:mc="http://schemas.openxmlformats.org/markup-compatibility/2006">
               <mc:Choice xmlns:v="urn:schemas-microsoft-com:vml" Requires="v">
-                <p:oleObj spid="_x0000_s1059" name="Equation" r:id="rId6" imgW="1485900" imgH="228600" progId="Equation.DSMT4">
+                <p:oleObj spid="_x0000_s1062" name="Equation" r:id="rId6" imgW="1485900" imgH="228600" progId="Equation.DSMT4">
                   <p:embed/>
                 </p:oleObj>
               </mc:Choice>
@@ -6769,11 +6784,11 @@
           <a:p>
             <a:r>
               <a:rPr lang="en-US" dirty="0" err="1" smtClean="0"/>
-              <a:t>lec</a:t>
+              <a:t>inversemodn</a:t>
             </a:r>
             <a:r>
               <a:rPr lang="en-US" dirty="0" smtClean="0"/>
-              <a:t> 5W.</a:t>
+              <a:t>.</a:t>
             </a:r>
             <a:fld id="{5653AFC6-B420-2E4E-AAAC-D734658728B4}" type="slidenum">
               <a:rPr lang="en-US" smtClean="0"/>
@@ -7591,11 +7606,11 @@
           <a:p>
             <a:r>
               <a:rPr lang="en-US" dirty="0" err="1" smtClean="0"/>
-              <a:t>lec</a:t>
+              <a:t>inversemodn</a:t>
             </a:r>
             <a:r>
               <a:rPr lang="en-US" dirty="0" smtClean="0"/>
-              <a:t> 5W.</a:t>
+              <a:t>.</a:t>
             </a:r>
             <a:fld id="{5653AFC6-B420-2E4E-AAAC-D734658728B4}" type="slidenum">
               <a:rPr lang="en-US" smtClean="0"/>

</xml_diff>